<commit_message>
M0127CC-8 - Update Schema | Readme
</commit_message>
<xml_diff>
--- a/FoundationLibrary-Get-Started/schema.pptx
+++ b/FoundationLibrary-Get-Started/schema.pptx
@@ -243,7 +243,7 @@
           <a:p>
             <a:fld id="{976E5056-CFED-4EFF-9BD5-4AA3836C5A35}" type="datetimeFigureOut">
               <a:rPr lang="en-US" smtClean="0"/>
-              <a:t>9/8/2017</a:t>
+              <a:t>9/14/2017</a:t>
             </a:fld>
             <a:endParaRPr lang="en-US"/>
           </a:p>
@@ -413,7 +413,7 @@
           <a:p>
             <a:fld id="{976E5056-CFED-4EFF-9BD5-4AA3836C5A35}" type="datetimeFigureOut">
               <a:rPr lang="en-US" smtClean="0"/>
-              <a:t>9/8/2017</a:t>
+              <a:t>9/14/2017</a:t>
             </a:fld>
             <a:endParaRPr lang="en-US"/>
           </a:p>
@@ -593,7 +593,7 @@
           <a:p>
             <a:fld id="{976E5056-CFED-4EFF-9BD5-4AA3836C5A35}" type="datetimeFigureOut">
               <a:rPr lang="en-US" smtClean="0"/>
-              <a:t>9/8/2017</a:t>
+              <a:t>9/14/2017</a:t>
             </a:fld>
             <a:endParaRPr lang="en-US"/>
           </a:p>
@@ -763,7 +763,7 @@
           <a:p>
             <a:fld id="{976E5056-CFED-4EFF-9BD5-4AA3836C5A35}" type="datetimeFigureOut">
               <a:rPr lang="en-US" smtClean="0"/>
-              <a:t>9/8/2017</a:t>
+              <a:t>9/14/2017</a:t>
             </a:fld>
             <a:endParaRPr lang="en-US"/>
           </a:p>
@@ -1009,7 +1009,7 @@
           <a:p>
             <a:fld id="{976E5056-CFED-4EFF-9BD5-4AA3836C5A35}" type="datetimeFigureOut">
               <a:rPr lang="en-US" smtClean="0"/>
-              <a:t>9/8/2017</a:t>
+              <a:t>9/14/2017</a:t>
             </a:fld>
             <a:endParaRPr lang="en-US"/>
           </a:p>
@@ -1241,7 +1241,7 @@
           <a:p>
             <a:fld id="{976E5056-CFED-4EFF-9BD5-4AA3836C5A35}" type="datetimeFigureOut">
               <a:rPr lang="en-US" smtClean="0"/>
-              <a:t>9/8/2017</a:t>
+              <a:t>9/14/2017</a:t>
             </a:fld>
             <a:endParaRPr lang="en-US"/>
           </a:p>
@@ -1608,7 +1608,7 @@
           <a:p>
             <a:fld id="{976E5056-CFED-4EFF-9BD5-4AA3836C5A35}" type="datetimeFigureOut">
               <a:rPr lang="en-US" smtClean="0"/>
-              <a:t>9/8/2017</a:t>
+              <a:t>9/14/2017</a:t>
             </a:fld>
             <a:endParaRPr lang="en-US"/>
           </a:p>
@@ -1726,7 +1726,7 @@
           <a:p>
             <a:fld id="{976E5056-CFED-4EFF-9BD5-4AA3836C5A35}" type="datetimeFigureOut">
               <a:rPr lang="en-US" smtClean="0"/>
-              <a:t>9/8/2017</a:t>
+              <a:t>9/14/2017</a:t>
             </a:fld>
             <a:endParaRPr lang="en-US"/>
           </a:p>
@@ -1821,7 +1821,7 @@
           <a:p>
             <a:fld id="{976E5056-CFED-4EFF-9BD5-4AA3836C5A35}" type="datetimeFigureOut">
               <a:rPr lang="en-US" smtClean="0"/>
-              <a:t>9/8/2017</a:t>
+              <a:t>9/14/2017</a:t>
             </a:fld>
             <a:endParaRPr lang="en-US"/>
           </a:p>
@@ -2098,7 +2098,7 @@
           <a:p>
             <a:fld id="{976E5056-CFED-4EFF-9BD5-4AA3836C5A35}" type="datetimeFigureOut">
               <a:rPr lang="en-US" smtClean="0"/>
-              <a:t>9/8/2017</a:t>
+              <a:t>9/14/2017</a:t>
             </a:fld>
             <a:endParaRPr lang="en-US"/>
           </a:p>
@@ -2351,7 +2351,7 @@
           <a:p>
             <a:fld id="{976E5056-CFED-4EFF-9BD5-4AA3836C5A35}" type="datetimeFigureOut">
               <a:rPr lang="en-US" smtClean="0"/>
-              <a:t>9/8/2017</a:t>
+              <a:t>9/14/2017</a:t>
             </a:fld>
             <a:endParaRPr lang="en-US"/>
           </a:p>
@@ -2564,7 +2564,7 @@
           <a:p>
             <a:fld id="{976E5056-CFED-4EFF-9BD5-4AA3836C5A35}" type="datetimeFigureOut">
               <a:rPr lang="en-US" smtClean="0"/>
-              <a:t>9/8/2017</a:t>
+              <a:t>9/14/2017</a:t>
             </a:fld>
             <a:endParaRPr lang="en-US"/>
           </a:p>
@@ -2977,8 +2977,8 @@
         </p:nvSpPr>
         <p:spPr>
           <a:xfrm>
-            <a:off x="1837038" y="295534"/>
-            <a:ext cx="2998573" cy="601362"/>
+            <a:off x="2342430" y="120060"/>
+            <a:ext cx="3476366" cy="601362"/>
           </a:xfrm>
           <a:prstGeom prst="rect">
             <a:avLst/>
@@ -3045,8 +3045,8 @@
         </p:nvSpPr>
         <p:spPr>
           <a:xfrm>
-            <a:off x="1837037" y="1160505"/>
-            <a:ext cx="2998573" cy="601362"/>
+            <a:off x="2342429" y="1160505"/>
+            <a:ext cx="3476367" cy="601362"/>
           </a:xfrm>
           <a:prstGeom prst="rect">
             <a:avLst/>
@@ -3080,7 +3080,6 @@
               <a:rPr lang="en-US" dirty="0" smtClean="0"/>
               <a:t>IMPLEMENTATION</a:t>
             </a:r>
-            <a:endParaRPr lang="en-US" dirty="0" smtClean="0"/>
           </a:p>
           <a:p>
             <a:pPr lvl="1" algn="ctr"/>
@@ -3111,8 +3110,8 @@
         </p:nvSpPr>
         <p:spPr>
           <a:xfrm>
-            <a:off x="1083276" y="2417804"/>
-            <a:ext cx="2253048" cy="580769"/>
+            <a:off x="4380485" y="2186116"/>
+            <a:ext cx="1119961" cy="580768"/>
           </a:xfrm>
           <a:prstGeom prst="rect">
             <a:avLst/>
@@ -3144,7 +3143,7 @@
             <a:pPr algn="ctr"/>
             <a:r>
               <a:rPr lang="en-US" dirty="0" smtClean="0"/>
-              <a:t>Mock</a:t>
+              <a:t>Net Mock</a:t>
             </a:r>
             <a:endParaRPr lang="en-US" dirty="0" smtClean="0"/>
           </a:p>
@@ -3178,8 +3177,8 @@
         </p:nvSpPr>
         <p:spPr>
           <a:xfrm>
-            <a:off x="3484603" y="2417804"/>
-            <a:ext cx="2253048" cy="580769"/>
+            <a:off x="2807079" y="2186115"/>
+            <a:ext cx="1119961" cy="580769"/>
           </a:xfrm>
           <a:prstGeom prst="rect">
             <a:avLst/>
@@ -3211,7 +3210,7 @@
             <a:pPr algn="ctr"/>
             <a:r>
               <a:rPr lang="en-US" dirty="0" smtClean="0"/>
-              <a:t>Embedded</a:t>
+              <a:t>Net</a:t>
             </a:r>
             <a:endParaRPr lang="en-US" dirty="0" smtClean="0"/>
           </a:p>
@@ -3233,107 +3232,6 @@
               <a:t>  </a:t>
             </a:r>
             <a:endParaRPr lang="en-US" sz="1000" b="1" dirty="0" smtClean="0"/>
-          </a:p>
-        </p:txBody>
-      </p:sp>
-      <p:sp>
-        <p:nvSpPr>
-          <p:cNvPr id="11" name="Right Brace 10"/>
-          <p:cNvSpPr/>
-          <p:nvPr/>
-        </p:nvSpPr>
-        <p:spPr>
-          <a:xfrm>
-            <a:off x="4835610" y="1105929"/>
-            <a:ext cx="205946" cy="776416"/>
-          </a:xfrm>
-          <a:prstGeom prst="rightBrace">
-            <a:avLst/>
-          </a:prstGeom>
-        </p:spPr>
-        <p:style>
-          <a:lnRef idx="2">
-            <a:schemeClr val="accent2"/>
-          </a:lnRef>
-          <a:fillRef idx="0">
-            <a:schemeClr val="accent2"/>
-          </a:fillRef>
-          <a:effectRef idx="1">
-            <a:schemeClr val="accent2"/>
-          </a:effectRef>
-          <a:fontRef idx="minor">
-            <a:schemeClr val="tx1"/>
-          </a:fontRef>
-        </p:style>
-        <p:txBody>
-          <a:bodyPr rtlCol="0" anchor="ctr"/>
-          <a:lstStyle/>
-          <a:p>
-            <a:pPr algn="ctr"/>
-            <a:endParaRPr lang="en-US"/>
-          </a:p>
-        </p:txBody>
-      </p:sp>
-      <p:sp>
-        <p:nvSpPr>
-          <p:cNvPr id="12" name="Rectangle 11"/>
-          <p:cNvSpPr/>
-          <p:nvPr/>
-        </p:nvSpPr>
-        <p:spPr>
-          <a:xfrm>
-            <a:off x="5140406" y="1253180"/>
-            <a:ext cx="1664048" cy="480883"/>
-          </a:xfrm>
-          <a:prstGeom prst="rect">
-            <a:avLst/>
-          </a:prstGeom>
-          <a:solidFill>
-            <a:srgbClr val="CF4520"/>
-          </a:solidFill>
-          <a:ln>
-            <a:solidFill>
-              <a:srgbClr val="CF4520"/>
-            </a:solidFill>
-          </a:ln>
-        </p:spPr>
-        <p:style>
-          <a:lnRef idx="2">
-            <a:schemeClr val="accent2">
-              <a:shade val="50000"/>
-            </a:schemeClr>
-          </a:lnRef>
-          <a:fillRef idx="1">
-            <a:schemeClr val="accent2"/>
-          </a:fillRef>
-          <a:effectRef idx="0">
-            <a:schemeClr val="accent2"/>
-          </a:effectRef>
-          <a:fontRef idx="minor">
-            <a:schemeClr val="lt1"/>
-          </a:fontRef>
-        </p:style>
-        <p:txBody>
-          <a:bodyPr rtlCol="0" anchor="ctr"/>
-          <a:lstStyle/>
-          <a:p>
-            <a:pPr algn="ctr"/>
-            <a:r>
-              <a:rPr lang="en-US" sz="1050" dirty="0" smtClean="0"/>
-              <a:t>Interface between Java and Hardware</a:t>
-            </a:r>
-          </a:p>
-          <a:p>
-            <a:pPr lvl="1" algn="ctr"/>
-            <a:endParaRPr lang="en-US" sz="500" b="1" dirty="0" smtClean="0"/>
-          </a:p>
-          <a:p>
-            <a:pPr lvl="1" algn="ctr"/>
-            <a:r>
-              <a:rPr lang="en-US" sz="500" dirty="0" smtClean="0"/>
-              <a:t>  </a:t>
-            </a:r>
-            <a:endParaRPr lang="en-US" sz="500" b="1" dirty="0" smtClean="0"/>
           </a:p>
         </p:txBody>
       </p:sp>
@@ -3345,7 +3243,7 @@
         </p:nvSpPr>
         <p:spPr>
           <a:xfrm>
-            <a:off x="331403" y="469555"/>
+            <a:off x="164497" y="481909"/>
             <a:ext cx="230833" cy="2529017"/>
           </a:xfrm>
           <a:prstGeom prst="downArrow">
@@ -3385,7 +3283,7 @@
         </p:nvSpPr>
         <p:spPr>
           <a:xfrm rot="16200000">
-            <a:off x="-467498" y="1416734"/>
+            <a:off x="-543101" y="1446178"/>
             <a:ext cx="2356026" cy="461665"/>
           </a:xfrm>
           <a:prstGeom prst="rect">
@@ -3410,36 +3308,281 @@
       </p:sp>
       <p:cxnSp>
         <p:nvCxnSpPr>
-          <p:cNvPr id="23" name="Straight Arrow Connector 22"/>
+          <p:cNvPr id="3" name="Straight Connector 2"/>
+          <p:cNvCxnSpPr/>
+          <p:nvPr/>
+        </p:nvCxnSpPr>
+        <p:spPr>
+          <a:xfrm>
+            <a:off x="4113563" y="1882345"/>
+            <a:ext cx="1" cy="3340444"/>
+          </a:xfrm>
+          <a:prstGeom prst="line">
+            <a:avLst/>
+          </a:prstGeom>
+          <a:ln>
+            <a:prstDash val="dash"/>
+          </a:ln>
+        </p:spPr>
+        <p:style>
+          <a:lnRef idx="2">
+            <a:schemeClr val="dk1"/>
+          </a:lnRef>
+          <a:fillRef idx="0">
+            <a:schemeClr val="dk1"/>
+          </a:fillRef>
+          <a:effectRef idx="1">
+            <a:schemeClr val="dk1"/>
+          </a:effectRef>
+          <a:fontRef idx="minor">
+            <a:schemeClr val="tx1"/>
+          </a:fontRef>
+        </p:style>
+      </p:cxnSp>
+      <p:cxnSp>
+        <p:nvCxnSpPr>
+          <p:cNvPr id="17" name="Straight Connector 16"/>
+          <p:cNvCxnSpPr/>
+          <p:nvPr/>
+        </p:nvCxnSpPr>
+        <p:spPr>
+          <a:xfrm>
+            <a:off x="1158240" y="1880284"/>
+            <a:ext cx="5852160" cy="0"/>
+          </a:xfrm>
+          <a:prstGeom prst="line">
+            <a:avLst/>
+          </a:prstGeom>
+          <a:ln>
+            <a:prstDash val="dash"/>
+          </a:ln>
+        </p:spPr>
+        <p:style>
+          <a:lnRef idx="2">
+            <a:schemeClr val="dk1"/>
+          </a:lnRef>
+          <a:fillRef idx="0">
+            <a:schemeClr val="dk1"/>
+          </a:fillRef>
+          <a:effectRef idx="1">
+            <a:schemeClr val="dk1"/>
+          </a:effectRef>
+          <a:fontRef idx="minor">
+            <a:schemeClr val="tx1"/>
+          </a:fontRef>
+        </p:style>
+      </p:cxnSp>
+      <p:sp>
+        <p:nvSpPr>
+          <p:cNvPr id="24" name="Rectangle 23"/>
+          <p:cNvSpPr/>
+          <p:nvPr/>
+        </p:nvSpPr>
+        <p:spPr>
+          <a:xfrm>
+            <a:off x="5625598" y="2186116"/>
+            <a:ext cx="1119961" cy="580768"/>
+          </a:xfrm>
+          <a:prstGeom prst="rect">
+            <a:avLst/>
+          </a:prstGeom>
+          <a:solidFill>
+            <a:srgbClr val="008EAA"/>
+          </a:solidFill>
+        </p:spPr>
+        <p:style>
+          <a:lnRef idx="2">
+            <a:schemeClr val="accent1">
+              <a:shade val="50000"/>
+            </a:schemeClr>
+          </a:lnRef>
+          <a:fillRef idx="1">
+            <a:schemeClr val="accent1"/>
+          </a:fillRef>
+          <a:effectRef idx="0">
+            <a:schemeClr val="accent1"/>
+          </a:effectRef>
+          <a:fontRef idx="minor">
+            <a:schemeClr val="lt1"/>
+          </a:fontRef>
+        </p:style>
+        <p:txBody>
+          <a:bodyPr rtlCol="0" anchor="ctr"/>
+          <a:lstStyle/>
+          <a:p>
+            <a:pPr algn="ctr"/>
+            <a:r>
+              <a:rPr lang="en-US" dirty="0" smtClean="0"/>
+              <a:t>SSL Mock</a:t>
+            </a:r>
+            <a:endParaRPr lang="en-US" dirty="0" smtClean="0"/>
+          </a:p>
+          <a:p>
+            <a:pPr lvl="1" algn="ctr"/>
+            <a:r>
+              <a:rPr lang="en-US" sz="1000" dirty="0" smtClean="0"/>
+              <a:t>- </a:t>
+            </a:r>
+            <a:r>
+              <a:rPr lang="en-US" sz="1000" b="1" dirty="0" err="1" smtClean="0"/>
+              <a:t>JavaSE</a:t>
+            </a:r>
+            <a:endParaRPr lang="en-US" sz="1000" b="1" dirty="0" smtClean="0"/>
+          </a:p>
+          <a:p>
+            <a:pPr lvl="1" algn="ctr"/>
+            <a:r>
+              <a:rPr lang="en-US" sz="1000" dirty="0" smtClean="0"/>
+              <a:t>  </a:t>
+            </a:r>
+            <a:endParaRPr lang="en-US" sz="1000" b="1" dirty="0" smtClean="0"/>
+          </a:p>
+        </p:txBody>
+      </p:sp>
+      <p:sp>
+        <p:nvSpPr>
+          <p:cNvPr id="36" name="Rectangle 35"/>
+          <p:cNvSpPr/>
+          <p:nvPr/>
+        </p:nvSpPr>
+        <p:spPr>
+          <a:xfrm>
+            <a:off x="1520746" y="2186115"/>
+            <a:ext cx="1119961" cy="580769"/>
+          </a:xfrm>
+          <a:prstGeom prst="rect">
+            <a:avLst/>
+          </a:prstGeom>
+          <a:solidFill>
+            <a:srgbClr val="008EAA"/>
+          </a:solidFill>
+        </p:spPr>
+        <p:style>
+          <a:lnRef idx="2">
+            <a:schemeClr val="accent1">
+              <a:shade val="50000"/>
+            </a:schemeClr>
+          </a:lnRef>
+          <a:fillRef idx="1">
+            <a:schemeClr val="accent1"/>
+          </a:fillRef>
+          <a:effectRef idx="0">
+            <a:schemeClr val="accent1"/>
+          </a:effectRef>
+          <a:fontRef idx="minor">
+            <a:schemeClr val="lt1"/>
+          </a:fontRef>
+        </p:style>
+        <p:txBody>
+          <a:bodyPr rtlCol="0" anchor="ctr"/>
+          <a:lstStyle/>
+          <a:p>
+            <a:pPr algn="ctr"/>
+            <a:r>
+              <a:rPr lang="en-US" dirty="0" smtClean="0"/>
+              <a:t>SSL</a:t>
+            </a:r>
+            <a:endParaRPr lang="en-US" dirty="0" smtClean="0"/>
+          </a:p>
+          <a:p>
+            <a:pPr lvl="1" algn="ctr"/>
+            <a:r>
+              <a:rPr lang="en-US" sz="1000" dirty="0" smtClean="0"/>
+              <a:t>- </a:t>
+            </a:r>
+            <a:r>
+              <a:rPr lang="en-US" sz="1000" b="1" dirty="0" smtClean="0"/>
+              <a:t>C</a:t>
+            </a:r>
+          </a:p>
+          <a:p>
+            <a:pPr lvl="1" algn="ctr"/>
+            <a:r>
+              <a:rPr lang="en-US" sz="1000" dirty="0" smtClean="0"/>
+              <a:t>  </a:t>
+            </a:r>
+            <a:endParaRPr lang="en-US" sz="1000" b="1" dirty="0" smtClean="0"/>
+          </a:p>
+        </p:txBody>
+      </p:sp>
+      <p:sp>
+        <p:nvSpPr>
+          <p:cNvPr id="37" name="Rectangle 36"/>
+          <p:cNvSpPr/>
+          <p:nvPr/>
+        </p:nvSpPr>
+        <p:spPr>
+          <a:xfrm>
+            <a:off x="1504003" y="3669551"/>
+            <a:ext cx="2377872" cy="397472"/>
+          </a:xfrm>
+          <a:prstGeom prst="rect">
+            <a:avLst/>
+          </a:prstGeom>
+          <a:solidFill>
+            <a:srgbClr val="008EAA"/>
+          </a:solidFill>
+        </p:spPr>
+        <p:style>
+          <a:lnRef idx="2">
+            <a:schemeClr val="accent1">
+              <a:shade val="50000"/>
+            </a:schemeClr>
+          </a:lnRef>
+          <a:fillRef idx="1">
+            <a:schemeClr val="accent1"/>
+          </a:fillRef>
+          <a:effectRef idx="0">
+            <a:schemeClr val="accent1"/>
+          </a:effectRef>
+          <a:fontRef idx="minor">
+            <a:schemeClr val="lt1"/>
+          </a:fontRef>
+        </p:style>
+        <p:txBody>
+          <a:bodyPr rtlCol="0" anchor="ctr"/>
+          <a:lstStyle/>
+          <a:p>
+            <a:pPr algn="ctr"/>
+            <a:r>
+              <a:rPr lang="en-US" sz="1000" b="1" dirty="0" smtClean="0"/>
+              <a:t>Drivers (Board Support Package)</a:t>
+            </a:r>
+            <a:endParaRPr lang="en-US" sz="1000" b="1" dirty="0" smtClean="0"/>
+          </a:p>
+        </p:txBody>
+      </p:sp>
+      <p:cxnSp>
+        <p:nvCxnSpPr>
+          <p:cNvPr id="39" name="Straight Arrow Connector 38"/>
           <p:cNvCxnSpPr>
-            <a:stCxn id="4" idx="2"/>
-            <a:endCxn id="6" idx="0"/>
+            <a:stCxn id="36" idx="2"/>
           </p:cNvCxnSpPr>
           <p:nvPr/>
         </p:nvCxnSpPr>
         <p:spPr>
           <a:xfrm flipH="1">
-            <a:off x="3336324" y="896896"/>
-            <a:ext cx="1" cy="263609"/>
+            <a:off x="2080726" y="2766884"/>
+            <a:ext cx="1" cy="902667"/>
           </a:xfrm>
           <a:prstGeom prst="straightConnector1">
             <a:avLst/>
           </a:prstGeom>
           <a:ln>
             <a:solidFill>
-              <a:srgbClr val="48A23F"/>
+              <a:schemeClr val="tx1"/>
             </a:solidFill>
             <a:tailEnd type="triangle"/>
           </a:ln>
         </p:spPr>
         <p:style>
-          <a:lnRef idx="3">
+          <a:lnRef idx="1">
             <a:schemeClr val="accent1"/>
           </a:lnRef>
           <a:fillRef idx="0">
             <a:schemeClr val="accent1"/>
           </a:fillRef>
-          <a:effectRef idx="2">
+          <a:effectRef idx="0">
             <a:schemeClr val="accent1"/>
           </a:effectRef>
           <a:fontRef idx="minor">
@@ -3449,33 +3592,35 @@
       </p:cxnSp>
       <p:cxnSp>
         <p:nvCxnSpPr>
-          <p:cNvPr id="25" name="Straight Arrow Connector 24"/>
+          <p:cNvPr id="40" name="Straight Arrow Connector 39"/>
           <p:cNvCxnSpPr>
-            <a:stCxn id="6" idx="2"/>
-            <a:endCxn id="7" idx="0"/>
+            <a:stCxn id="8" idx="2"/>
           </p:cNvCxnSpPr>
           <p:nvPr/>
         </p:nvCxnSpPr>
         <p:spPr>
-          <a:xfrm flipH="1">
-            <a:off x="2209800" y="1761867"/>
-            <a:ext cx="1126524" cy="655937"/>
+          <a:xfrm>
+            <a:off x="3367060" y="2766884"/>
+            <a:ext cx="10075" cy="902667"/>
           </a:xfrm>
           <a:prstGeom prst="straightConnector1">
             <a:avLst/>
           </a:prstGeom>
           <a:ln>
+            <a:solidFill>
+              <a:schemeClr val="tx1"/>
+            </a:solidFill>
             <a:tailEnd type="triangle"/>
           </a:ln>
         </p:spPr>
         <p:style>
-          <a:lnRef idx="3">
+          <a:lnRef idx="1">
             <a:schemeClr val="accent1"/>
           </a:lnRef>
           <a:fillRef idx="0">
             <a:schemeClr val="accent1"/>
           </a:fillRef>
-          <a:effectRef idx="2">
+          <a:effectRef idx="0">
             <a:schemeClr val="accent1"/>
           </a:effectRef>
           <a:fontRef idx="minor">
@@ -3485,30 +3630,163 @@
       </p:cxnSp>
       <p:cxnSp>
         <p:nvCxnSpPr>
-          <p:cNvPr id="27" name="Straight Arrow Connector 26"/>
-          <p:cNvCxnSpPr/>
+          <p:cNvPr id="49" name="Straight Arrow Connector 48"/>
+          <p:cNvCxnSpPr>
+            <a:stCxn id="37" idx="2"/>
+            <a:endCxn id="55" idx="0"/>
+          </p:cNvCxnSpPr>
           <p:nvPr/>
         </p:nvCxnSpPr>
         <p:spPr>
           <a:xfrm>
-            <a:off x="3348677" y="1765984"/>
-            <a:ext cx="1274803" cy="655937"/>
+            <a:off x="2692939" y="4067023"/>
+            <a:ext cx="0" cy="573154"/>
           </a:xfrm>
           <a:prstGeom prst="straightConnector1">
             <a:avLst/>
           </a:prstGeom>
           <a:ln>
+            <a:headEnd type="triangle"/>
             <a:tailEnd type="triangle"/>
           </a:ln>
         </p:spPr>
         <p:style>
-          <a:lnRef idx="3">
+          <a:lnRef idx="1">
+            <a:schemeClr val="dk1"/>
+          </a:lnRef>
+          <a:fillRef idx="0">
+            <a:schemeClr val="dk1"/>
+          </a:fillRef>
+          <a:effectRef idx="0">
+            <a:schemeClr val="dk1"/>
+          </a:effectRef>
+          <a:fontRef idx="minor">
+            <a:schemeClr val="tx1"/>
+          </a:fontRef>
+        </p:style>
+      </p:cxnSp>
+      <p:sp>
+        <p:nvSpPr>
+          <p:cNvPr id="53" name="Rounded Rectangle 52"/>
+          <p:cNvSpPr/>
+          <p:nvPr/>
+        </p:nvSpPr>
+        <p:spPr>
+          <a:xfrm>
+            <a:off x="4586001" y="4656856"/>
+            <a:ext cx="1799559" cy="568408"/>
+          </a:xfrm>
+          <a:prstGeom prst="roundRect">
+            <a:avLst/>
+          </a:prstGeom>
+        </p:spPr>
+        <p:style>
+          <a:lnRef idx="2">
+            <a:schemeClr val="dk1"/>
+          </a:lnRef>
+          <a:fillRef idx="1">
+            <a:schemeClr val="lt1"/>
+          </a:fillRef>
+          <a:effectRef idx="0">
+            <a:schemeClr val="dk1"/>
+          </a:effectRef>
+          <a:fontRef idx="minor">
+            <a:schemeClr val="dk1"/>
+          </a:fontRef>
+        </p:style>
+        <p:txBody>
+          <a:bodyPr rtlCol="0" anchor="ctr"/>
+          <a:lstStyle/>
+          <a:p>
+            <a:pPr algn="ctr"/>
+            <a:r>
+              <a:rPr lang="en-US" sz="1100" dirty="0" smtClean="0"/>
+              <a:t>Simulator</a:t>
+            </a:r>
+            <a:endParaRPr lang="en-US" sz="1100" dirty="0"/>
+          </a:p>
+        </p:txBody>
+      </p:sp>
+      <p:sp>
+        <p:nvSpPr>
+          <p:cNvPr id="55" name="Rounded Rectangle 54"/>
+          <p:cNvSpPr/>
+          <p:nvPr/>
+        </p:nvSpPr>
+        <p:spPr>
+          <a:xfrm>
+            <a:off x="1793159" y="4640177"/>
+            <a:ext cx="1799559" cy="568408"/>
+          </a:xfrm>
+          <a:prstGeom prst="roundRect">
+            <a:avLst/>
+          </a:prstGeom>
+        </p:spPr>
+        <p:style>
+          <a:lnRef idx="2">
+            <a:schemeClr val="dk1"/>
+          </a:lnRef>
+          <a:fillRef idx="1">
+            <a:schemeClr val="lt1"/>
+          </a:fillRef>
+          <a:effectRef idx="0">
+            <a:schemeClr val="dk1"/>
+          </a:effectRef>
+          <a:fontRef idx="minor">
+            <a:schemeClr val="dk1"/>
+          </a:fontRef>
+        </p:style>
+        <p:txBody>
+          <a:bodyPr rtlCol="0" anchor="ctr"/>
+          <a:lstStyle/>
+          <a:p>
+            <a:pPr algn="ctr"/>
+            <a:r>
+              <a:rPr lang="en-US" sz="1100" dirty="0" smtClean="0"/>
+              <a:t>Target</a:t>
+            </a:r>
+          </a:p>
+          <a:p>
+            <a:pPr algn="ctr"/>
+            <a:r>
+              <a:rPr lang="en-US" sz="1100" dirty="0" smtClean="0"/>
+              <a:t>Hardware</a:t>
+            </a:r>
+            <a:endParaRPr lang="en-US" sz="1100" dirty="0"/>
+          </a:p>
+        </p:txBody>
+      </p:sp>
+      <p:cxnSp>
+        <p:nvCxnSpPr>
+          <p:cNvPr id="58" name="Straight Arrow Connector 57"/>
+          <p:cNvCxnSpPr>
+            <a:stCxn id="7" idx="2"/>
+          </p:cNvCxnSpPr>
+          <p:nvPr/>
+        </p:nvCxnSpPr>
+        <p:spPr>
+          <a:xfrm>
+            <a:off x="4940466" y="2766884"/>
+            <a:ext cx="1" cy="1888942"/>
+          </a:xfrm>
+          <a:prstGeom prst="straightConnector1">
+            <a:avLst/>
+          </a:prstGeom>
+          <a:ln>
+            <a:solidFill>
+              <a:schemeClr val="tx1"/>
+            </a:solidFill>
+            <a:tailEnd type="triangle"/>
+          </a:ln>
+        </p:spPr>
+        <p:style>
+          <a:lnRef idx="1">
             <a:schemeClr val="accent1"/>
           </a:lnRef>
           <a:fillRef idx="0">
             <a:schemeClr val="accent1"/>
           </a:fillRef>
-          <a:effectRef idx="2">
+          <a:effectRef idx="0">
             <a:schemeClr val="accent1"/>
           </a:effectRef>
           <a:fontRef idx="minor">
@@ -3516,6 +3794,281 @@
           </a:fontRef>
         </p:style>
       </p:cxnSp>
+      <p:cxnSp>
+        <p:nvCxnSpPr>
+          <p:cNvPr id="60" name="Straight Arrow Connector 59"/>
+          <p:cNvCxnSpPr>
+            <a:stCxn id="24" idx="2"/>
+          </p:cNvCxnSpPr>
+          <p:nvPr/>
+        </p:nvCxnSpPr>
+        <p:spPr>
+          <a:xfrm>
+            <a:off x="6185579" y="2766884"/>
+            <a:ext cx="1" cy="1884828"/>
+          </a:xfrm>
+          <a:prstGeom prst="straightConnector1">
+            <a:avLst/>
+          </a:prstGeom>
+          <a:ln>
+            <a:solidFill>
+              <a:schemeClr val="tx1"/>
+            </a:solidFill>
+            <a:tailEnd type="triangle"/>
+          </a:ln>
+        </p:spPr>
+        <p:style>
+          <a:lnRef idx="1">
+            <a:schemeClr val="accent1"/>
+          </a:lnRef>
+          <a:fillRef idx="0">
+            <a:schemeClr val="accent1"/>
+          </a:fillRef>
+          <a:effectRef idx="0">
+            <a:schemeClr val="accent1"/>
+          </a:effectRef>
+          <a:fontRef idx="minor">
+            <a:schemeClr val="tx1"/>
+          </a:fontRef>
+        </p:style>
+      </p:cxnSp>
+      <p:cxnSp>
+        <p:nvCxnSpPr>
+          <p:cNvPr id="62" name="Straight Arrow Connector 61"/>
+          <p:cNvCxnSpPr>
+            <a:stCxn id="4" idx="2"/>
+            <a:endCxn id="6" idx="0"/>
+          </p:cNvCxnSpPr>
+          <p:nvPr/>
+        </p:nvCxnSpPr>
+        <p:spPr>
+          <a:xfrm>
+            <a:off x="4080613" y="721422"/>
+            <a:ext cx="0" cy="439083"/>
+          </a:xfrm>
+          <a:prstGeom prst="straightConnector1">
+            <a:avLst/>
+          </a:prstGeom>
+          <a:ln>
+            <a:headEnd type="triangle"/>
+            <a:tailEnd type="triangle"/>
+          </a:ln>
+        </p:spPr>
+        <p:style>
+          <a:lnRef idx="2">
+            <a:schemeClr val="dk1"/>
+          </a:lnRef>
+          <a:fillRef idx="0">
+            <a:schemeClr val="dk1"/>
+          </a:fillRef>
+          <a:effectRef idx="1">
+            <a:schemeClr val="dk1"/>
+          </a:effectRef>
+          <a:fontRef idx="minor">
+            <a:schemeClr val="tx1"/>
+          </a:fontRef>
+        </p:style>
+      </p:cxnSp>
+      <p:cxnSp>
+        <p:nvCxnSpPr>
+          <p:cNvPr id="63" name="Straight Arrow Connector 62"/>
+          <p:cNvCxnSpPr>
+            <a:endCxn id="8" idx="0"/>
+          </p:cNvCxnSpPr>
+          <p:nvPr/>
+        </p:nvCxnSpPr>
+        <p:spPr>
+          <a:xfrm>
+            <a:off x="3367059" y="1775252"/>
+            <a:ext cx="1" cy="410863"/>
+          </a:xfrm>
+          <a:prstGeom prst="straightConnector1">
+            <a:avLst/>
+          </a:prstGeom>
+          <a:ln>
+            <a:headEnd type="triangle"/>
+            <a:tailEnd type="triangle"/>
+          </a:ln>
+        </p:spPr>
+        <p:style>
+          <a:lnRef idx="1">
+            <a:schemeClr val="dk1"/>
+          </a:lnRef>
+          <a:fillRef idx="0">
+            <a:schemeClr val="dk1"/>
+          </a:fillRef>
+          <a:effectRef idx="0">
+            <a:schemeClr val="dk1"/>
+          </a:effectRef>
+          <a:fontRef idx="minor">
+            <a:schemeClr val="tx1"/>
+          </a:fontRef>
+        </p:style>
+      </p:cxnSp>
+      <p:cxnSp>
+        <p:nvCxnSpPr>
+          <p:cNvPr id="66" name="Straight Arrow Connector 65"/>
+          <p:cNvCxnSpPr>
+            <a:endCxn id="7" idx="0"/>
+          </p:cNvCxnSpPr>
+          <p:nvPr/>
+        </p:nvCxnSpPr>
+        <p:spPr>
+          <a:xfrm>
+            <a:off x="4940465" y="1810906"/>
+            <a:ext cx="1" cy="375210"/>
+          </a:xfrm>
+          <a:prstGeom prst="straightConnector1">
+            <a:avLst/>
+          </a:prstGeom>
+          <a:ln>
+            <a:headEnd type="triangle"/>
+            <a:tailEnd type="triangle"/>
+          </a:ln>
+        </p:spPr>
+        <p:style>
+          <a:lnRef idx="1">
+            <a:schemeClr val="dk1"/>
+          </a:lnRef>
+          <a:fillRef idx="0">
+            <a:schemeClr val="dk1"/>
+          </a:fillRef>
+          <a:effectRef idx="0">
+            <a:schemeClr val="dk1"/>
+          </a:effectRef>
+          <a:fontRef idx="minor">
+            <a:schemeClr val="tx1"/>
+          </a:fontRef>
+        </p:style>
+      </p:cxnSp>
+      <p:cxnSp>
+        <p:nvCxnSpPr>
+          <p:cNvPr id="67" name="Straight Arrow Connector 66"/>
+          <p:cNvCxnSpPr/>
+          <p:nvPr/>
+        </p:nvCxnSpPr>
+        <p:spPr>
+          <a:xfrm>
+            <a:off x="5720591" y="1740755"/>
+            <a:ext cx="11543" cy="445361"/>
+          </a:xfrm>
+          <a:prstGeom prst="straightConnector1">
+            <a:avLst/>
+          </a:prstGeom>
+          <a:ln>
+            <a:headEnd type="triangle"/>
+            <a:tailEnd type="triangle"/>
+          </a:ln>
+        </p:spPr>
+        <p:style>
+          <a:lnRef idx="1">
+            <a:schemeClr val="dk1"/>
+          </a:lnRef>
+          <a:fillRef idx="0">
+            <a:schemeClr val="dk1"/>
+          </a:fillRef>
+          <a:effectRef idx="0">
+            <a:schemeClr val="dk1"/>
+          </a:effectRef>
+          <a:fontRef idx="minor">
+            <a:schemeClr val="tx1"/>
+          </a:fontRef>
+        </p:style>
+      </p:cxnSp>
+      <p:cxnSp>
+        <p:nvCxnSpPr>
+          <p:cNvPr id="70" name="Straight Arrow Connector 69"/>
+          <p:cNvCxnSpPr/>
+          <p:nvPr/>
+        </p:nvCxnSpPr>
+        <p:spPr>
+          <a:xfrm>
+            <a:off x="2462204" y="1760423"/>
+            <a:ext cx="5488" cy="425692"/>
+          </a:xfrm>
+          <a:prstGeom prst="straightConnector1">
+            <a:avLst/>
+          </a:prstGeom>
+          <a:ln>
+            <a:headEnd type="triangle"/>
+            <a:tailEnd type="triangle"/>
+          </a:ln>
+        </p:spPr>
+        <p:style>
+          <a:lnRef idx="1">
+            <a:schemeClr val="dk1"/>
+          </a:lnRef>
+          <a:fillRef idx="0">
+            <a:schemeClr val="dk1"/>
+          </a:fillRef>
+          <a:effectRef idx="0">
+            <a:schemeClr val="dk1"/>
+          </a:effectRef>
+          <a:fontRef idx="minor">
+            <a:schemeClr val="tx1"/>
+          </a:fontRef>
+        </p:style>
+      </p:cxnSp>
+      <p:sp>
+        <p:nvSpPr>
+          <p:cNvPr id="77" name="TextBox 76"/>
+          <p:cNvSpPr txBox="1"/>
+          <p:nvPr/>
+        </p:nvSpPr>
+        <p:spPr>
+          <a:xfrm>
+            <a:off x="6372711" y="1854746"/>
+            <a:ext cx="1144402" cy="261610"/>
+          </a:xfrm>
+          <a:prstGeom prst="rect">
+            <a:avLst/>
+          </a:prstGeom>
+          <a:noFill/>
+        </p:spPr>
+        <p:txBody>
+          <a:bodyPr wrap="square" rtlCol="0">
+            <a:spAutoFit/>
+          </a:bodyPr>
+          <a:lstStyle/>
+          <a:p>
+            <a:r>
+              <a:rPr lang="en-US" sz="1050" b="1" dirty="0" smtClean="0"/>
+              <a:t>Simulator</a:t>
+            </a:r>
+            <a:endParaRPr lang="en-US" b="1" dirty="0"/>
+          </a:p>
+        </p:txBody>
+      </p:sp>
+      <p:sp>
+        <p:nvSpPr>
+          <p:cNvPr id="86" name="TextBox 85"/>
+          <p:cNvSpPr txBox="1"/>
+          <p:nvPr/>
+        </p:nvSpPr>
+        <p:spPr>
+          <a:xfrm>
+            <a:off x="944551" y="1854746"/>
+            <a:ext cx="1144402" cy="261610"/>
+          </a:xfrm>
+          <a:prstGeom prst="rect">
+            <a:avLst/>
+          </a:prstGeom>
+          <a:noFill/>
+        </p:spPr>
+        <p:txBody>
+          <a:bodyPr wrap="square" rtlCol="0">
+            <a:spAutoFit/>
+          </a:bodyPr>
+          <a:lstStyle/>
+          <a:p>
+            <a:r>
+              <a:rPr lang="en-US" sz="1050" b="1" dirty="0" smtClean="0"/>
+              <a:t>Hardware</a:t>
+            </a:r>
+            <a:endParaRPr lang="en-US" b="1" dirty="0"/>
+          </a:p>
+        </p:txBody>
+      </p:sp>
     </p:spTree>
     <p:extLst>
       <p:ext uri="{BB962C8B-B14F-4D97-AF65-F5344CB8AC3E}">

</xml_diff>